<commit_message>
Implemented Slide Delete of Crew
</commit_message>
<xml_diff>
--- a/Ionic2.pptx
+++ b/Ionic2.pptx
@@ -218,7 +218,7 @@
             <a:fld id="{D2C27654-C3D2-48E1-BF6F-1D7841C66EDD}" type="datetimeFigureOut">
               <a:rPr lang="en-US" smtClean="0"/>
               <a:pPr/>
-              <a:t>10/15/2016</a:t>
+              <a:t>10/18/2016</a:t>
             </a:fld>
             <a:endParaRPr lang="en-US"/>
           </a:p>
@@ -558,7 +558,7 @@
             <a:fld id="{1C295150-4FD7-4802-B0EB-D52217513A72}" type="datetime1">
               <a:rPr lang="en-US" smtClean="0"/>
               <a:pPr/>
-              <a:t>10/15/2016</a:t>
+              <a:t>10/18/2016</a:t>
             </a:fld>
             <a:endParaRPr lang="en-US" dirty="0"/>
           </a:p>
@@ -1183,7 +1183,7 @@
             <a:fld id="{E600D5EF-7D26-425F-8C45-B9312ACE18BC}" type="datetime1">
               <a:rPr lang="en-US" smtClean="0"/>
               <a:pPr/>
-              <a:t>10/15/2016</a:t>
+              <a:t>10/18/2016</a:t>
             </a:fld>
             <a:endParaRPr lang="en-US"/>
           </a:p>
@@ -1348,7 +1348,7 @@
             <a:fld id="{0461895A-832A-4167-BE9B-7448CA062309}" type="datetime1">
               <a:rPr lang="en-US" smtClean="0"/>
               <a:pPr/>
-              <a:t>10/15/2016</a:t>
+              <a:t>10/18/2016</a:t>
             </a:fld>
             <a:endParaRPr lang="en-US"/>
           </a:p>
@@ -1654,7 +1654,7 @@
             <a:fld id="{227571FF-D602-4BB6-9683-7A1E909D4296}" type="datetime1">
               <a:rPr lang="en-US" smtClean="0"/>
               <a:pPr/>
-              <a:t>10/15/2016</a:t>
+              <a:t>10/18/2016</a:t>
             </a:fld>
             <a:endParaRPr lang="en-US"/>
           </a:p>
@@ -1932,7 +1932,7 @@
             <a:fld id="{FC392BEB-5202-498C-89F7-BBD3BEE1B887}" type="datetime1">
               <a:rPr lang="en-US" smtClean="0"/>
               <a:pPr/>
-              <a:t>10/15/2016</a:t>
+              <a:t>10/18/2016</a:t>
             </a:fld>
             <a:endParaRPr lang="en-US"/>
           </a:p>
@@ -2490,7 +2490,7 @@
             <a:fld id="{D242B6C6-10FF-4510-A888-F0B9C6A788B0}" type="datetime1">
               <a:rPr lang="en-US" smtClean="0"/>
               <a:pPr/>
-              <a:t>10/15/2016</a:t>
+              <a:t>10/18/2016</a:t>
             </a:fld>
             <a:endParaRPr lang="en-US"/>
           </a:p>
@@ -2582,7 +2582,7 @@
             <a:fld id="{C2847B31-A4E1-4FCE-8661-5EC33A675437}" type="datetime1">
               <a:rPr lang="en-US" smtClean="0"/>
               <a:pPr/>
-              <a:t>10/15/2016</a:t>
+              <a:t>10/18/2016</a:t>
             </a:fld>
             <a:endParaRPr lang="en-US"/>
           </a:p>
@@ -2947,7 +2947,7 @@
             <a:fld id="{C2847B31-A4E1-4FCE-8661-5EC33A675437}" type="datetime1">
               <a:rPr lang="en-US" smtClean="0"/>
               <a:pPr/>
-              <a:t>10/15/2016</a:t>
+              <a:t>10/18/2016</a:t>
             </a:fld>
             <a:endParaRPr lang="en-US"/>
           </a:p>
@@ -3655,7 +3655,7 @@
             <a:fld id="{7CAD832D-B7F8-4A85-B115-3F84BE9AC26D}" type="datetime1">
               <a:rPr lang="en-US" smtClean="0"/>
               <a:pPr/>
-              <a:t>10/15/2016</a:t>
+              <a:t>10/18/2016</a:t>
             </a:fld>
             <a:endParaRPr lang="en-US"/>
           </a:p>
@@ -3900,7 +3900,7 @@
             <a:fld id="{E10B34F3-05F7-41C1-B84E-68CE2E00C83C}" type="datetime1">
               <a:rPr lang="en-US" smtClean="0"/>
               <a:pPr/>
-              <a:t>10/15/2016</a:t>
+              <a:t>10/18/2016</a:t>
             </a:fld>
             <a:endParaRPr lang="en-US"/>
           </a:p>
@@ -4122,7 +4122,7 @@
             <a:fld id="{B8D47F82-2B2E-4837-B3AB-C94C672FBECB}" type="datetime1">
               <a:rPr lang="en-US" smtClean="0"/>
               <a:pPr/>
-              <a:t>10/15/2016</a:t>
+              <a:t>10/18/2016</a:t>
             </a:fld>
             <a:endParaRPr lang="en-US"/>
           </a:p>
@@ -4397,7 +4397,7 @@
             <a:fld id="{81E57738-F4B0-48EA-9B71-E0F723F8BF6C}" type="datetime1">
               <a:rPr lang="en-US" smtClean="0"/>
               <a:pPr/>
-              <a:t>10/15/2016</a:t>
+              <a:t>10/18/2016</a:t>
             </a:fld>
             <a:endParaRPr lang="en-US"/>
           </a:p>
@@ -4667,7 +4667,7 @@
             <a:fld id="{F1909345-DEE0-4B07-8E32-441AC9DA095E}" type="datetime1">
               <a:rPr lang="en-US" smtClean="0"/>
               <a:pPr/>
-              <a:t>10/15/2016</a:t>
+              <a:t>10/18/2016</a:t>
             </a:fld>
             <a:endParaRPr lang="en-US" dirty="0"/>
           </a:p>
@@ -6487,7 +6487,7 @@
         <p:spPr/>
         <p:txBody>
           <a:bodyPr>
-            <a:normAutofit fontScale="92500" lnSpcReduction="10000"/>
+            <a:normAutofit fontScale="77500" lnSpcReduction="20000"/>
           </a:bodyPr>
           <a:lstStyle/>
           <a:p>
@@ -6514,6 +6514,26 @@
             <a:r>
               <a:rPr lang="en-US" dirty="0"/>
               <a:t>Use chrome://inspect/#devices</a:t>
+            </a:r>
+          </a:p>
+          <a:p>
+            <a:r>
+              <a:rPr lang="en-US" dirty="0"/>
+              <a:t>AVOID </a:t>
+            </a:r>
+            <a:r>
+              <a:rPr lang="en-US" dirty="0" err="1"/>
+              <a:t>Hammerjs</a:t>
+            </a:r>
+            <a:r>
+              <a:rPr lang="en-US" dirty="0"/>
+              <a:t> gestures on scrollable views</a:t>
+            </a:r>
+          </a:p>
+          <a:p>
+            <a:r>
+              <a:rPr lang="en-US" dirty="0"/>
+              <a:t>Images: Do not use ‘/images/’, use ‘images/’</a:t>
             </a:r>
           </a:p>
           <a:p>

</xml_diff>